<commit_message>
removed space for romain
</commit_message>
<xml_diff>
--- a/Slides_10.pptx
+++ b/Slides_10.pptx
@@ -7010,10 +7010,10 @@
             </a:pPr>
             <a:r>
               <a:rPr lang="fr-FR" dirty="0"/>
-              <a:t>** </a:t>
-            </a:r>
-            <a:r>
-              <a:rPr lang="fr-FR" dirty="0" err="1"/>
+              <a:t>**</a:t>
+            </a:r>
+            <a:r>
+              <a:rPr lang="fr-FR"/>
               <a:t>supposedly</a:t>
             </a:r>
             <a:r>

</xml_diff>